<commit_message>
updates to presentation for lecture 1 and two complete notebooks
</commit_message>
<xml_diff>
--- a/docs/module1/Presentation1.pptx
+++ b/docs/module1/Presentation1.pptx
@@ -23,6 +23,9 @@
     <p:sldId id="273" r:id="rId17"/>
     <p:sldId id="274" r:id="rId18"/>
     <p:sldId id="275" r:id="rId19"/>
+    <p:sldId id="276" r:id="rId20"/>
+    <p:sldId id="277" r:id="rId21"/>
+    <p:sldId id="278" r:id="rId22"/>
   </p:sldIdLst>
   <p:sldSz cx="9144000" cy="6858000" type="screen4x3"/>
   <p:notesSz cx="6858000" cy="9144000"/>
@@ -5708,6 +5711,271 @@
 </p:sld>
 </file>
 
+<file path=ppt/slides/slide19.xml><?xml version="1.0" encoding="utf-8"?>
+<p:sld xmlns:a="http://schemas.openxmlformats.org/drawingml/2006/main" xmlns:r="http://schemas.openxmlformats.org/officeDocument/2006/relationships" xmlns:p="http://schemas.openxmlformats.org/presentationml/2006/main">
+  <p:cSld>
+    <p:spTree>
+      <p:nvGrpSpPr>
+        <p:cNvPr id="1" name=""/>
+        <p:cNvGrpSpPr/>
+        <p:nvPr/>
+      </p:nvGrpSpPr>
+      <p:grpSpPr>
+        <a:xfrm>
+          <a:off x="0" y="0"/>
+          <a:ext cx="0" cy="0"/>
+          <a:chOff x="0" y="0"/>
+          <a:chExt cx="0" cy="0"/>
+        </a:xfrm>
+      </p:grpSpPr>
+      <p:sp>
+        <p:nvSpPr>
+          <p:cNvPr id="2" name="Title 1"/>
+          <p:cNvSpPr>
+            <a:spLocks noGrp="1"/>
+          </p:cNvSpPr>
+          <p:nvPr>
+            <p:ph type="ctrTitle"/>
+          </p:nvPr>
+        </p:nvSpPr>
+        <p:spPr>
+          <a:xfrm>
+            <a:off x="685800" y="307072"/>
+            <a:ext cx="7772400" cy="887537"/>
+          </a:xfrm>
+        </p:spPr>
+        <p:txBody>
+          <a:bodyPr>
+            <a:normAutofit/>
+          </a:bodyPr>
+          <a:lstStyle/>
+          <a:p>
+            <a:r>
+              <a:rPr lang="en-US" dirty="0" smtClean="0"/>
+              <a:t>Course Topics</a:t>
+            </a:r>
+            <a:endParaRPr lang="en-US" dirty="0"/>
+          </a:p>
+        </p:txBody>
+      </p:sp>
+      <p:sp>
+        <p:nvSpPr>
+          <p:cNvPr id="15" name="Subtitle 3"/>
+          <p:cNvSpPr>
+            <a:spLocks noGrp="1"/>
+          </p:cNvSpPr>
+          <p:nvPr>
+            <p:ph type="subTitle" idx="1"/>
+          </p:nvPr>
+        </p:nvSpPr>
+        <p:spPr>
+          <a:xfrm>
+            <a:off x="685800" y="1295208"/>
+            <a:ext cx="7772400" cy="5029933"/>
+          </a:xfrm>
+        </p:spPr>
+        <p:txBody>
+          <a:bodyPr>
+            <a:normAutofit fontScale="77500" lnSpcReduction="20000"/>
+          </a:bodyPr>
+          <a:lstStyle/>
+          <a:p>
+            <a:pPr marL="457200" indent="-457200" algn="l">
+              <a:buFont typeface="Arial"/>
+              <a:buChar char="•"/>
+            </a:pPr>
+            <a:r>
+              <a:rPr lang="en-US" dirty="0" smtClean="0">
+                <a:solidFill>
+                  <a:schemeClr val="tx1"/>
+                </a:solidFill>
+              </a:rPr>
+              <a:t>Supervised Learning Methods (Classification/Regression)</a:t>
+            </a:r>
+          </a:p>
+          <a:p>
+            <a:pPr marL="914400" lvl="1" indent="-457200" algn="l">
+              <a:buFont typeface="Arial"/>
+              <a:buChar char="•"/>
+            </a:pPr>
+            <a:r>
+              <a:rPr lang="en-US" dirty="0" smtClean="0">
+                <a:solidFill>
+                  <a:schemeClr val="tx1"/>
+                </a:solidFill>
+              </a:rPr>
+              <a:t>Basic Linear Models (today)</a:t>
+            </a:r>
+          </a:p>
+          <a:p>
+            <a:pPr marL="914400" lvl="1" indent="-457200" algn="l">
+              <a:buFont typeface="Arial"/>
+              <a:buChar char="•"/>
+            </a:pPr>
+            <a:r>
+              <a:rPr lang="en-US" dirty="0" smtClean="0">
+                <a:solidFill>
+                  <a:schemeClr val="tx1"/>
+                </a:solidFill>
+              </a:rPr>
+              <a:t>Trees and Forests</a:t>
+            </a:r>
+          </a:p>
+          <a:p>
+            <a:pPr marL="457200" indent="-457200" algn="l">
+              <a:buFont typeface="Arial"/>
+              <a:buChar char="•"/>
+            </a:pPr>
+            <a:r>
+              <a:rPr lang="en-US" dirty="0" smtClean="0">
+                <a:solidFill>
+                  <a:schemeClr val="tx1"/>
+                </a:solidFill>
+              </a:rPr>
+              <a:t>Unsupervised Learning</a:t>
+            </a:r>
+          </a:p>
+          <a:p>
+            <a:pPr marL="914400" lvl="1" indent="-457200" algn="l">
+              <a:buFont typeface="Arial"/>
+              <a:buChar char="•"/>
+            </a:pPr>
+            <a:r>
+              <a:rPr lang="en-US" dirty="0" smtClean="0">
+                <a:solidFill>
+                  <a:schemeClr val="tx1"/>
+                </a:solidFill>
+              </a:rPr>
+              <a:t>Clustering</a:t>
+            </a:r>
+          </a:p>
+          <a:p>
+            <a:pPr marL="914400" lvl="1" indent="-457200" algn="l">
+              <a:buFont typeface="Arial"/>
+              <a:buChar char="•"/>
+            </a:pPr>
+            <a:r>
+              <a:rPr lang="en-US" dirty="0" smtClean="0">
+                <a:solidFill>
+                  <a:schemeClr val="tx1"/>
+                </a:solidFill>
+              </a:rPr>
+              <a:t>Dimensionality Reduction</a:t>
+            </a:r>
+          </a:p>
+          <a:p>
+            <a:pPr marL="914400" lvl="1" indent="-457200" algn="l">
+              <a:buFont typeface="Arial"/>
+              <a:buChar char="•"/>
+            </a:pPr>
+            <a:r>
+              <a:rPr lang="en-US" dirty="0" smtClean="0">
+                <a:solidFill>
+                  <a:schemeClr val="tx1"/>
+                </a:solidFill>
+              </a:rPr>
+              <a:t>Topic Models</a:t>
+            </a:r>
+          </a:p>
+          <a:p>
+            <a:pPr marL="457200" indent="-457200" algn="l">
+              <a:buFont typeface="Arial"/>
+              <a:buChar char="•"/>
+            </a:pPr>
+            <a:r>
+              <a:rPr lang="en-US" dirty="0" smtClean="0">
+                <a:solidFill>
+                  <a:schemeClr val="tx1"/>
+                </a:solidFill>
+              </a:rPr>
+              <a:t>Domain-specific Machine Learning</a:t>
+            </a:r>
+          </a:p>
+          <a:p>
+            <a:pPr marL="914400" lvl="1" indent="-457200" algn="l">
+              <a:buFont typeface="Arial"/>
+              <a:buChar char="•"/>
+            </a:pPr>
+            <a:r>
+              <a:rPr lang="en-US" dirty="0" smtClean="0">
+                <a:solidFill>
+                  <a:schemeClr val="tx1"/>
+                </a:solidFill>
+              </a:rPr>
+              <a:t>Recommender Systems</a:t>
+            </a:r>
+          </a:p>
+          <a:p>
+            <a:pPr marL="914400" lvl="1" indent="-457200" algn="l">
+              <a:buFont typeface="Arial"/>
+              <a:buChar char="•"/>
+            </a:pPr>
+            <a:r>
+              <a:rPr lang="en-US" dirty="0" smtClean="0">
+                <a:solidFill>
+                  <a:schemeClr val="tx1"/>
+                </a:solidFill>
+              </a:rPr>
+              <a:t>Advanced Topics</a:t>
+            </a:r>
+          </a:p>
+          <a:p>
+            <a:pPr marL="914400" lvl="1" indent="-457200" algn="l">
+              <a:buFont typeface="Arial"/>
+              <a:buChar char="•"/>
+            </a:pPr>
+            <a:r>
+              <a:rPr lang="en-US" dirty="0" smtClean="0">
+                <a:solidFill>
+                  <a:schemeClr val="tx1"/>
+                </a:solidFill>
+              </a:rPr>
+              <a:t>Anomaly Detection</a:t>
+            </a:r>
+          </a:p>
+          <a:p>
+            <a:pPr marL="914400" lvl="1" indent="-457200" algn="l">
+              <a:buFont typeface="Arial"/>
+              <a:buChar char="•"/>
+            </a:pPr>
+            <a:r>
+              <a:rPr lang="en-US" dirty="0" smtClean="0">
+                <a:solidFill>
+                  <a:schemeClr val="tx1"/>
+                </a:solidFill>
+              </a:rPr>
+              <a:t>Learning to Rank</a:t>
+            </a:r>
+          </a:p>
+          <a:p>
+            <a:pPr marL="457200" indent="-457200" algn="l">
+              <a:buFont typeface="Arial"/>
+              <a:buChar char="•"/>
+            </a:pPr>
+            <a:r>
+              <a:rPr lang="en-US" dirty="0" smtClean="0">
+                <a:solidFill>
+                  <a:schemeClr val="tx1"/>
+                </a:solidFill>
+              </a:rPr>
+              <a:t>Project Presentations</a:t>
+            </a:r>
+          </a:p>
+        </p:txBody>
+      </p:sp>
+    </p:spTree>
+    <p:extLst>
+      <p:ext uri="{BB962C8B-B14F-4D97-AF65-F5344CB8AC3E}">
+        <p14:creationId xmlns:p14="http://schemas.microsoft.com/office/powerpoint/2010/main" val="3996963723"/>
+      </p:ext>
+    </p:extLst>
+  </p:cSld>
+  <p:clrMapOvr>
+    <a:masterClrMapping/>
+  </p:clrMapOvr>
+</p:sld>
+</file>
+
 <file path=ppt/slides/slide2.xml><?xml version="1.0" encoding="utf-8"?>
 <p:sld xmlns:a="http://schemas.openxmlformats.org/drawingml/2006/main" xmlns:r="http://schemas.openxmlformats.org/officeDocument/2006/relationships" xmlns:p="http://schemas.openxmlformats.org/presentationml/2006/main">
   <p:cSld>
@@ -6258,6 +6526,382 @@
     <p:extLst>
       <p:ext uri="{BB962C8B-B14F-4D97-AF65-F5344CB8AC3E}">
         <p14:creationId xmlns:p14="http://schemas.microsoft.com/office/powerpoint/2010/main" val="289725133"/>
+      </p:ext>
+    </p:extLst>
+  </p:cSld>
+  <p:clrMapOvr>
+    <a:masterClrMapping/>
+  </p:clrMapOvr>
+</p:sld>
+</file>
+
+<file path=ppt/slides/slide20.xml><?xml version="1.0" encoding="utf-8"?>
+<p:sld xmlns:a="http://schemas.openxmlformats.org/drawingml/2006/main" xmlns:r="http://schemas.openxmlformats.org/officeDocument/2006/relationships" xmlns:p="http://schemas.openxmlformats.org/presentationml/2006/main">
+  <p:cSld>
+    <p:spTree>
+      <p:nvGrpSpPr>
+        <p:cNvPr id="1" name=""/>
+        <p:cNvGrpSpPr/>
+        <p:nvPr/>
+      </p:nvGrpSpPr>
+      <p:grpSpPr>
+        <a:xfrm>
+          <a:off x="0" y="0"/>
+          <a:ext cx="0" cy="0"/>
+          <a:chOff x="0" y="0"/>
+          <a:chExt cx="0" cy="0"/>
+        </a:xfrm>
+      </p:grpSpPr>
+      <p:sp>
+        <p:nvSpPr>
+          <p:cNvPr id="2" name="Title 1"/>
+          <p:cNvSpPr>
+            <a:spLocks noGrp="1"/>
+          </p:cNvSpPr>
+          <p:nvPr>
+            <p:ph type="ctrTitle"/>
+          </p:nvPr>
+        </p:nvSpPr>
+        <p:spPr>
+          <a:xfrm>
+            <a:off x="685800" y="307072"/>
+            <a:ext cx="7772400" cy="887537"/>
+          </a:xfrm>
+        </p:spPr>
+        <p:txBody>
+          <a:bodyPr>
+            <a:normAutofit/>
+          </a:bodyPr>
+          <a:lstStyle/>
+          <a:p>
+            <a:r>
+              <a:rPr lang="en-US" dirty="0" smtClean="0"/>
+              <a:t>Course Topics</a:t>
+            </a:r>
+            <a:endParaRPr lang="en-US" dirty="0"/>
+          </a:p>
+        </p:txBody>
+      </p:sp>
+      <p:sp>
+        <p:nvSpPr>
+          <p:cNvPr id="15" name="Subtitle 3"/>
+          <p:cNvSpPr>
+            <a:spLocks noGrp="1"/>
+          </p:cNvSpPr>
+          <p:nvPr>
+            <p:ph type="subTitle" idx="1"/>
+          </p:nvPr>
+        </p:nvSpPr>
+        <p:spPr>
+          <a:xfrm>
+            <a:off x="685800" y="1295208"/>
+            <a:ext cx="7772400" cy="5029933"/>
+          </a:xfrm>
+        </p:spPr>
+        <p:txBody>
+          <a:bodyPr>
+            <a:normAutofit fontScale="77500" lnSpcReduction="20000"/>
+          </a:bodyPr>
+          <a:lstStyle/>
+          <a:p>
+            <a:pPr marL="457200" indent="-457200" algn="l">
+              <a:buFont typeface="Arial"/>
+              <a:buChar char="•"/>
+            </a:pPr>
+            <a:r>
+              <a:rPr lang="en-US" dirty="0" smtClean="0">
+                <a:solidFill>
+                  <a:schemeClr val="tx1"/>
+                </a:solidFill>
+              </a:rPr>
+              <a:t>Supervised Learning Methods (Classification/Regression)</a:t>
+            </a:r>
+          </a:p>
+          <a:p>
+            <a:pPr marL="914400" lvl="1" indent="-457200" algn="l">
+              <a:buFont typeface="Arial"/>
+              <a:buChar char="•"/>
+            </a:pPr>
+            <a:r>
+              <a:rPr lang="en-US" dirty="0" smtClean="0">
+                <a:solidFill>
+                  <a:schemeClr val="tx1"/>
+                </a:solidFill>
+              </a:rPr>
+              <a:t>Basic Linear Models (today)</a:t>
+            </a:r>
+          </a:p>
+          <a:p>
+            <a:pPr marL="914400" lvl="1" indent="-457200" algn="l">
+              <a:buFont typeface="Arial"/>
+              <a:buChar char="•"/>
+            </a:pPr>
+            <a:r>
+              <a:rPr lang="en-US" dirty="0" smtClean="0">
+                <a:solidFill>
+                  <a:schemeClr val="tx1"/>
+                </a:solidFill>
+              </a:rPr>
+              <a:t>Trees and Forests</a:t>
+            </a:r>
+          </a:p>
+          <a:p>
+            <a:pPr marL="457200" indent="-457200" algn="l">
+              <a:buFont typeface="Arial"/>
+              <a:buChar char="•"/>
+            </a:pPr>
+            <a:r>
+              <a:rPr lang="en-US" dirty="0" smtClean="0">
+                <a:solidFill>
+                  <a:schemeClr val="tx1"/>
+                </a:solidFill>
+              </a:rPr>
+              <a:t>Unsupervised Learning</a:t>
+            </a:r>
+          </a:p>
+          <a:p>
+            <a:pPr marL="914400" lvl="1" indent="-457200" algn="l">
+              <a:buFont typeface="Arial"/>
+              <a:buChar char="•"/>
+            </a:pPr>
+            <a:r>
+              <a:rPr lang="en-US" dirty="0" smtClean="0">
+                <a:solidFill>
+                  <a:schemeClr val="tx1"/>
+                </a:solidFill>
+              </a:rPr>
+              <a:t>Clustering</a:t>
+            </a:r>
+          </a:p>
+          <a:p>
+            <a:pPr marL="914400" lvl="1" indent="-457200" algn="l">
+              <a:buFont typeface="Arial"/>
+              <a:buChar char="•"/>
+            </a:pPr>
+            <a:r>
+              <a:rPr lang="en-US" dirty="0" smtClean="0">
+                <a:solidFill>
+                  <a:schemeClr val="tx1"/>
+                </a:solidFill>
+              </a:rPr>
+              <a:t>Dimensionality Reduction</a:t>
+            </a:r>
+          </a:p>
+          <a:p>
+            <a:pPr marL="914400" lvl="1" indent="-457200" algn="l">
+              <a:buFont typeface="Arial"/>
+              <a:buChar char="•"/>
+            </a:pPr>
+            <a:r>
+              <a:rPr lang="en-US" dirty="0" smtClean="0">
+                <a:solidFill>
+                  <a:schemeClr val="tx1"/>
+                </a:solidFill>
+              </a:rPr>
+              <a:t>Topic Models</a:t>
+            </a:r>
+          </a:p>
+          <a:p>
+            <a:pPr marL="457200" indent="-457200" algn="l">
+              <a:buFont typeface="Arial"/>
+              <a:buChar char="•"/>
+            </a:pPr>
+            <a:r>
+              <a:rPr lang="en-US" dirty="0" smtClean="0">
+                <a:solidFill>
+                  <a:schemeClr val="tx1"/>
+                </a:solidFill>
+              </a:rPr>
+              <a:t>Domain-specific Machine Learning</a:t>
+            </a:r>
+          </a:p>
+          <a:p>
+            <a:pPr marL="914400" lvl="1" indent="-457200" algn="l">
+              <a:buFont typeface="Arial"/>
+              <a:buChar char="•"/>
+            </a:pPr>
+            <a:r>
+              <a:rPr lang="en-US" dirty="0" smtClean="0">
+                <a:solidFill>
+                  <a:schemeClr val="tx1"/>
+                </a:solidFill>
+              </a:rPr>
+              <a:t>Recommender Systems</a:t>
+            </a:r>
+          </a:p>
+          <a:p>
+            <a:pPr marL="914400" lvl="1" indent="-457200" algn="l">
+              <a:buFont typeface="Arial"/>
+              <a:buChar char="•"/>
+            </a:pPr>
+            <a:r>
+              <a:rPr lang="en-US" dirty="0" smtClean="0">
+                <a:solidFill>
+                  <a:schemeClr val="tx1"/>
+                </a:solidFill>
+              </a:rPr>
+              <a:t>Advanced Topics</a:t>
+            </a:r>
+          </a:p>
+          <a:p>
+            <a:pPr marL="914400" lvl="1" indent="-457200" algn="l">
+              <a:buFont typeface="Arial"/>
+              <a:buChar char="•"/>
+            </a:pPr>
+            <a:r>
+              <a:rPr lang="en-US" dirty="0" smtClean="0">
+                <a:solidFill>
+                  <a:schemeClr val="tx1"/>
+                </a:solidFill>
+              </a:rPr>
+              <a:t>Anomaly Detection</a:t>
+            </a:r>
+          </a:p>
+          <a:p>
+            <a:pPr marL="914400" lvl="1" indent="-457200" algn="l">
+              <a:buFont typeface="Arial"/>
+              <a:buChar char="•"/>
+            </a:pPr>
+            <a:r>
+              <a:rPr lang="en-US" dirty="0" smtClean="0">
+                <a:solidFill>
+                  <a:schemeClr val="tx1"/>
+                </a:solidFill>
+              </a:rPr>
+              <a:t>Learning to Rank</a:t>
+            </a:r>
+          </a:p>
+          <a:p>
+            <a:pPr marL="457200" indent="-457200" algn="l">
+              <a:buFont typeface="Arial"/>
+              <a:buChar char="•"/>
+            </a:pPr>
+            <a:r>
+              <a:rPr lang="en-US" dirty="0" smtClean="0">
+                <a:solidFill>
+                  <a:schemeClr val="tx1"/>
+                </a:solidFill>
+              </a:rPr>
+              <a:t>Project Presentations</a:t>
+            </a:r>
+          </a:p>
+        </p:txBody>
+      </p:sp>
+    </p:spTree>
+    <p:extLst>
+      <p:ext uri="{BB962C8B-B14F-4D97-AF65-F5344CB8AC3E}">
+        <p14:creationId xmlns:p14="http://schemas.microsoft.com/office/powerpoint/2010/main" val="2320978498"/>
+      </p:ext>
+    </p:extLst>
+  </p:cSld>
+  <p:clrMapOvr>
+    <a:masterClrMapping/>
+  </p:clrMapOvr>
+</p:sld>
+</file>
+
+<file path=ppt/slides/slide21.xml><?xml version="1.0" encoding="utf-8"?>
+<p:sld xmlns:a="http://schemas.openxmlformats.org/drawingml/2006/main" xmlns:r="http://schemas.openxmlformats.org/officeDocument/2006/relationships" xmlns:p="http://schemas.openxmlformats.org/presentationml/2006/main">
+  <p:cSld>
+    <p:spTree>
+      <p:nvGrpSpPr>
+        <p:cNvPr id="1" name=""/>
+        <p:cNvGrpSpPr/>
+        <p:nvPr/>
+      </p:nvGrpSpPr>
+      <p:grpSpPr>
+        <a:xfrm>
+          <a:off x="0" y="0"/>
+          <a:ext cx="0" cy="0"/>
+          <a:chOff x="0" y="0"/>
+          <a:chExt cx="0" cy="0"/>
+        </a:xfrm>
+      </p:grpSpPr>
+      <p:sp>
+        <p:nvSpPr>
+          <p:cNvPr id="2" name="Title 1"/>
+          <p:cNvSpPr>
+            <a:spLocks noGrp="1"/>
+          </p:cNvSpPr>
+          <p:nvPr>
+            <p:ph type="ctrTitle"/>
+          </p:nvPr>
+        </p:nvSpPr>
+        <p:spPr>
+          <a:xfrm>
+            <a:off x="685800" y="307072"/>
+            <a:ext cx="7772400" cy="887537"/>
+          </a:xfrm>
+        </p:spPr>
+        <p:txBody>
+          <a:bodyPr>
+            <a:normAutofit/>
+          </a:bodyPr>
+          <a:lstStyle/>
+          <a:p>
+            <a:r>
+              <a:rPr lang="en-US" dirty="0" smtClean="0"/>
+              <a:t>Course Topics</a:t>
+            </a:r>
+            <a:endParaRPr lang="en-US" dirty="0"/>
+          </a:p>
+        </p:txBody>
+      </p:sp>
+      <p:sp>
+        <p:nvSpPr>
+          <p:cNvPr id="15" name="Subtitle 3"/>
+          <p:cNvSpPr>
+            <a:spLocks noGrp="1"/>
+          </p:cNvSpPr>
+          <p:nvPr>
+            <p:ph type="subTitle" idx="1"/>
+          </p:nvPr>
+        </p:nvSpPr>
+        <p:spPr>
+          <a:xfrm>
+            <a:off x="685800" y="1471256"/>
+            <a:ext cx="7772400" cy="4853885"/>
+          </a:xfrm>
+        </p:spPr>
+        <p:txBody>
+          <a:bodyPr>
+            <a:normAutofit/>
+          </a:bodyPr>
+          <a:lstStyle/>
+          <a:p>
+            <a:pPr marL="457200" indent="-457200" algn="l">
+              <a:buFont typeface="Arial"/>
+              <a:buChar char="•"/>
+            </a:pPr>
+            <a:r>
+              <a:rPr lang="en-US" dirty="0" smtClean="0">
+                <a:solidFill>
+                  <a:schemeClr val="tx1"/>
+                </a:solidFill>
+              </a:rPr>
+              <a:t>What are you interested in learning?</a:t>
+            </a:r>
+          </a:p>
+          <a:p>
+            <a:pPr marL="914400" lvl="1" indent="-457200" algn="l">
+              <a:buFont typeface="Arial"/>
+              <a:buChar char="•"/>
+            </a:pPr>
+            <a:r>
+              <a:rPr lang="en-US" dirty="0" smtClean="0">
+                <a:solidFill>
+                  <a:schemeClr val="tx1"/>
+                </a:solidFill>
+              </a:rPr>
+              <a:t>Make suggestions in Discussion on Canvas site</a:t>
+            </a:r>
+          </a:p>
+        </p:txBody>
+      </p:sp>
+    </p:spTree>
+    <p:extLst>
+      <p:ext uri="{BB962C8B-B14F-4D97-AF65-F5344CB8AC3E}">
+        <p14:creationId xmlns:p14="http://schemas.microsoft.com/office/powerpoint/2010/main" val="4230743867"/>
       </p:ext>
     </p:extLst>
   </p:cSld>

</xml_diff>